<commit_message>
Uploading various assignment files
These are past assignments
</commit_message>
<xml_diff>
--- a/Week-1-Storyboard.pptx
+++ b/Week-1-Storyboard.pptx
@@ -104,6 +104,11 @@
       </a:defRPr>
     </a:lvl9pPr>
   </p:defaultTextStyle>
+  <p:extLst>
+    <p:ext uri="{EFAFB233-063F-42B5-8137-9DF3F51BA10A}">
+      <p15:sldGuideLst xmlns:p15="http://schemas.microsoft.com/office/powerpoint/2012/main"/>
+    </p:ext>
+  </p:extLst>
 </p:presentation>
 </file>
 
@@ -238,7 +243,7 @@
           <a:p>
             <a:fld id="{420309D7-A36F-4A0F-A04D-413660BBA635}" type="datetimeFigureOut">
               <a:rPr lang="en-US" smtClean="0"/>
-              <a:t>3/11/2024</a:t>
+              <a:t>3/31/2024</a:t>
             </a:fld>
             <a:endParaRPr lang="en-US"/>
           </a:p>
@@ -408,7 +413,7 @@
           <a:p>
             <a:fld id="{420309D7-A36F-4A0F-A04D-413660BBA635}" type="datetimeFigureOut">
               <a:rPr lang="en-US" smtClean="0"/>
-              <a:t>3/11/2024</a:t>
+              <a:t>3/31/2024</a:t>
             </a:fld>
             <a:endParaRPr lang="en-US"/>
           </a:p>
@@ -588,7 +593,7 @@
           <a:p>
             <a:fld id="{420309D7-A36F-4A0F-A04D-413660BBA635}" type="datetimeFigureOut">
               <a:rPr lang="en-US" smtClean="0"/>
-              <a:t>3/11/2024</a:t>
+              <a:t>3/31/2024</a:t>
             </a:fld>
             <a:endParaRPr lang="en-US"/>
           </a:p>
@@ -758,7 +763,7 @@
           <a:p>
             <a:fld id="{420309D7-A36F-4A0F-A04D-413660BBA635}" type="datetimeFigureOut">
               <a:rPr lang="en-US" smtClean="0"/>
-              <a:t>3/11/2024</a:t>
+              <a:t>3/31/2024</a:t>
             </a:fld>
             <a:endParaRPr lang="en-US"/>
           </a:p>
@@ -1004,7 +1009,7 @@
           <a:p>
             <a:fld id="{420309D7-A36F-4A0F-A04D-413660BBA635}" type="datetimeFigureOut">
               <a:rPr lang="en-US" smtClean="0"/>
-              <a:t>3/11/2024</a:t>
+              <a:t>3/31/2024</a:t>
             </a:fld>
             <a:endParaRPr lang="en-US"/>
           </a:p>
@@ -1236,7 +1241,7 @@
           <a:p>
             <a:fld id="{420309D7-A36F-4A0F-A04D-413660BBA635}" type="datetimeFigureOut">
               <a:rPr lang="en-US" smtClean="0"/>
-              <a:t>3/11/2024</a:t>
+              <a:t>3/31/2024</a:t>
             </a:fld>
             <a:endParaRPr lang="en-US"/>
           </a:p>
@@ -1603,7 +1608,7 @@
           <a:p>
             <a:fld id="{420309D7-A36F-4A0F-A04D-413660BBA635}" type="datetimeFigureOut">
               <a:rPr lang="en-US" smtClean="0"/>
-              <a:t>3/11/2024</a:t>
+              <a:t>3/31/2024</a:t>
             </a:fld>
             <a:endParaRPr lang="en-US"/>
           </a:p>
@@ -1721,7 +1726,7 @@
           <a:p>
             <a:fld id="{420309D7-A36F-4A0F-A04D-413660BBA635}" type="datetimeFigureOut">
               <a:rPr lang="en-US" smtClean="0"/>
-              <a:t>3/11/2024</a:t>
+              <a:t>3/31/2024</a:t>
             </a:fld>
             <a:endParaRPr lang="en-US"/>
           </a:p>
@@ -1816,7 +1821,7 @@
           <a:p>
             <a:fld id="{420309D7-A36F-4A0F-A04D-413660BBA635}" type="datetimeFigureOut">
               <a:rPr lang="en-US" smtClean="0"/>
-              <a:t>3/11/2024</a:t>
+              <a:t>3/31/2024</a:t>
             </a:fld>
             <a:endParaRPr lang="en-US"/>
           </a:p>
@@ -2093,7 +2098,7 @@
           <a:p>
             <a:fld id="{420309D7-A36F-4A0F-A04D-413660BBA635}" type="datetimeFigureOut">
               <a:rPr lang="en-US" smtClean="0"/>
-              <a:t>3/11/2024</a:t>
+              <a:t>3/31/2024</a:t>
             </a:fld>
             <a:endParaRPr lang="en-US"/>
           </a:p>
@@ -2350,7 +2355,7 @@
           <a:p>
             <a:fld id="{420309D7-A36F-4A0F-A04D-413660BBA635}" type="datetimeFigureOut">
               <a:rPr lang="en-US" smtClean="0"/>
-              <a:t>3/11/2024</a:t>
+              <a:t>3/31/2024</a:t>
             </a:fld>
             <a:endParaRPr lang="en-US"/>
           </a:p>
@@ -2563,7 +2568,7 @@
           <a:p>
             <a:fld id="{420309D7-A36F-4A0F-A04D-413660BBA635}" type="datetimeFigureOut">
               <a:rPr lang="en-US" smtClean="0"/>
-              <a:t>3/11/2024</a:t>
+              <a:t>3/31/2024</a:t>
             </a:fld>
             <a:endParaRPr lang="en-US"/>
           </a:p>
@@ -3428,17 +3433,17 @@
                   </a:schemeClr>
                 </a:solidFill>
               </a:rPr>
-              <a:t>Results Page</a:t>
-            </a:r>
-          </a:p>
-        </p:txBody>
-      </p:sp>
-      <p:sp>
-        <p:nvSpPr>
-          <p:cNvPr id="10" name="Rectangle: Rounded Corners 9">
+              <a:t>Search/Add to Cookbook Page</a:t>
+            </a:r>
+          </a:p>
+        </p:txBody>
+      </p:sp>
+      <p:sp>
+        <p:nvSpPr>
+          <p:cNvPr id="12" name="Rectangle: Rounded Corners 11">
             <a:extLst>
               <a:ext uri="{FF2B5EF4-FFF2-40B4-BE49-F238E27FC236}">
-                <a16:creationId xmlns:a16="http://schemas.microsoft.com/office/drawing/2014/main" id="{DFCB4C2E-A7DD-AD7C-A2DE-FE02F9773AAB}"/>
+                <a16:creationId xmlns:a16="http://schemas.microsoft.com/office/drawing/2014/main" id="{D813D767-23DC-83C8-5DA0-374C8A0F766C}"/>
               </a:ext>
             </a:extLst>
           </p:cNvPr>
@@ -3447,7 +3452,7 @@
         </p:nvSpPr>
         <p:spPr>
           <a:xfrm>
-            <a:off x="1067170" y="4839938"/>
+            <a:off x="3107213" y="3932261"/>
             <a:ext cx="1272620" cy="683443"/>
           </a:xfrm>
           <a:prstGeom prst="roundRect">
@@ -3499,17 +3504,17 @@
                   </a:schemeClr>
                 </a:solidFill>
               </a:rPr>
-              <a:t>Print/Share Page</a:t>
-            </a:r>
-          </a:p>
-        </p:txBody>
-      </p:sp>
-      <p:sp>
-        <p:nvSpPr>
-          <p:cNvPr id="11" name="Rectangle: Rounded Corners 10">
+              <a:t>Recipe Entry</a:t>
+            </a:r>
+          </a:p>
+        </p:txBody>
+      </p:sp>
+      <p:sp>
+        <p:nvSpPr>
+          <p:cNvPr id="14" name="Rectangle: Rounded Corners 13">
             <a:extLst>
               <a:ext uri="{FF2B5EF4-FFF2-40B4-BE49-F238E27FC236}">
-                <a16:creationId xmlns:a16="http://schemas.microsoft.com/office/drawing/2014/main" id="{EC825C85-D963-6C92-20E0-F7018693130A}"/>
+                <a16:creationId xmlns:a16="http://schemas.microsoft.com/office/drawing/2014/main" id="{D362A2E8-AFD1-5101-B4C5-AFEC45AB9020}"/>
               </a:ext>
             </a:extLst>
           </p:cNvPr>
@@ -3518,8 +3523,8 @@
         </p:nvSpPr>
         <p:spPr>
           <a:xfrm>
-            <a:off x="3117846" y="3932262"/>
-            <a:ext cx="1272620" cy="683443"/>
+            <a:off x="5082989" y="3932262"/>
+            <a:ext cx="1272620" cy="743955"/>
           </a:xfrm>
           <a:prstGeom prst="roundRect">
             <a:avLst/>
@@ -3570,17 +3575,31 @@
                   </a:schemeClr>
                 </a:solidFill>
               </a:rPr>
-              <a:t>Recipe Scope Page</a:t>
-            </a:r>
-          </a:p>
-        </p:txBody>
-      </p:sp>
-      <p:sp>
-        <p:nvSpPr>
-          <p:cNvPr id="12" name="Rectangle: Rounded Corners 11">
+              <a:t>Recipe Search/</a:t>
+            </a:r>
+          </a:p>
+          <a:p>
+            <a:pPr algn="ctr"/>
+            <a:r>
+              <a:rPr lang="en-US" sz="1350" dirty="0">
+                <a:solidFill>
+                  <a:schemeClr val="tx2">
+                    <a:lumMod val="75000"/>
+                    <a:lumOff val="25000"/>
+                  </a:schemeClr>
+                </a:solidFill>
+              </a:rPr>
+              <a:t>Selection</a:t>
+            </a:r>
+          </a:p>
+        </p:txBody>
+      </p:sp>
+      <p:sp>
+        <p:nvSpPr>
+          <p:cNvPr id="15" name="Rectangle: Rounded Corners 14">
             <a:extLst>
               <a:ext uri="{FF2B5EF4-FFF2-40B4-BE49-F238E27FC236}">
-                <a16:creationId xmlns:a16="http://schemas.microsoft.com/office/drawing/2014/main" id="{D813D767-23DC-83C8-5DA0-374C8A0F766C}"/>
+                <a16:creationId xmlns:a16="http://schemas.microsoft.com/office/drawing/2014/main" id="{BADE483C-31CD-7775-ABF3-8799ABC4D632}"/>
               </a:ext>
             </a:extLst>
           </p:cNvPr>
@@ -3589,8 +3608,8 @@
         </p:nvSpPr>
         <p:spPr>
           <a:xfrm>
-            <a:off x="3117846" y="4839938"/>
-            <a:ext cx="1272620" cy="683443"/>
+            <a:off x="5082989" y="4858298"/>
+            <a:ext cx="1272620" cy="743955"/>
           </a:xfrm>
           <a:prstGeom prst="roundRect">
             <a:avLst/>
@@ -3641,17 +3660,31 @@
                   </a:schemeClr>
                 </a:solidFill>
               </a:rPr>
-              <a:t>Recipe Entry</a:t>
-            </a:r>
-          </a:p>
-        </p:txBody>
-      </p:sp>
-      <p:sp>
-        <p:nvSpPr>
-          <p:cNvPr id="13" name="Rectangle: Rounded Corners 12">
+              <a:t>Link Preview/</a:t>
+            </a:r>
+          </a:p>
+          <a:p>
+            <a:pPr algn="ctr"/>
+            <a:r>
+              <a:rPr lang="en-US" sz="1350" dirty="0">
+                <a:solidFill>
+                  <a:schemeClr val="tx2">
+                    <a:lumMod val="75000"/>
+                    <a:lumOff val="25000"/>
+                  </a:schemeClr>
+                </a:solidFill>
+              </a:rPr>
+              <a:t>Share Results</a:t>
+            </a:r>
+          </a:p>
+        </p:txBody>
+      </p:sp>
+      <p:sp>
+        <p:nvSpPr>
+          <p:cNvPr id="16" name="Rectangle: Rounded Corners 15">
             <a:extLst>
               <a:ext uri="{FF2B5EF4-FFF2-40B4-BE49-F238E27FC236}">
-                <a16:creationId xmlns:a16="http://schemas.microsoft.com/office/drawing/2014/main" id="{817305AD-1C3A-CAEA-72BD-9FFE1E4BD207}"/>
+                <a16:creationId xmlns:a16="http://schemas.microsoft.com/office/drawing/2014/main" id="{EDF54BB9-6567-FE7A-FF7F-882820F91D2A}"/>
               </a:ext>
             </a:extLst>
           </p:cNvPr>
@@ -3660,7 +3693,7 @@
         </p:nvSpPr>
         <p:spPr>
           <a:xfrm>
-            <a:off x="3117846" y="5747614"/>
+            <a:off x="7133666" y="3933442"/>
             <a:ext cx="1272620" cy="743955"/>
           </a:xfrm>
           <a:prstGeom prst="roundRect">
@@ -3712,17 +3745,17 @@
                   </a:schemeClr>
                 </a:solidFill>
               </a:rPr>
-              <a:t>Recipe Details/Save Page</a:t>
-            </a:r>
-          </a:p>
-        </p:txBody>
-      </p:sp>
-      <p:sp>
-        <p:nvSpPr>
-          <p:cNvPr id="14" name="Rectangle: Rounded Corners 13">
+              <a:t>User Login Page</a:t>
+            </a:r>
+          </a:p>
+        </p:txBody>
+      </p:sp>
+      <p:sp>
+        <p:nvSpPr>
+          <p:cNvPr id="17" name="Rectangle: Rounded Corners 16">
             <a:extLst>
               <a:ext uri="{FF2B5EF4-FFF2-40B4-BE49-F238E27FC236}">
-                <a16:creationId xmlns:a16="http://schemas.microsoft.com/office/drawing/2014/main" id="{D362A2E8-AFD1-5101-B4C5-AFEC45AB9020}"/>
+                <a16:creationId xmlns:a16="http://schemas.microsoft.com/office/drawing/2014/main" id="{B2C1F001-9460-992A-CEC3-059A35E11DB9}"/>
               </a:ext>
             </a:extLst>
           </p:cNvPr>
@@ -3731,7 +3764,7 @@
         </p:nvSpPr>
         <p:spPr>
           <a:xfrm>
-            <a:off x="5082989" y="3932262"/>
+            <a:off x="7133665" y="4839938"/>
             <a:ext cx="1272620" cy="743955"/>
           </a:xfrm>
           <a:prstGeom prst="roundRect">
@@ -3783,247 +3816,6 @@
                   </a:schemeClr>
                 </a:solidFill>
               </a:rPr>
-              <a:t>Recipe Search/</a:t>
-            </a:r>
-          </a:p>
-          <a:p>
-            <a:pPr algn="ctr"/>
-            <a:r>
-              <a:rPr lang="en-US" sz="1350" dirty="0">
-                <a:solidFill>
-                  <a:schemeClr val="tx2">
-                    <a:lumMod val="75000"/>
-                    <a:lumOff val="25000"/>
-                  </a:schemeClr>
-                </a:solidFill>
-              </a:rPr>
-              <a:t>Selection</a:t>
-            </a:r>
-          </a:p>
-        </p:txBody>
-      </p:sp>
-      <p:sp>
-        <p:nvSpPr>
-          <p:cNvPr id="15" name="Rectangle: Rounded Corners 14">
-            <a:extLst>
-              <a:ext uri="{FF2B5EF4-FFF2-40B4-BE49-F238E27FC236}">
-                <a16:creationId xmlns:a16="http://schemas.microsoft.com/office/drawing/2014/main" id="{BADE483C-31CD-7775-ABF3-8799ABC4D632}"/>
-              </a:ext>
-            </a:extLst>
-          </p:cNvPr>
-          <p:cNvSpPr/>
-          <p:nvPr/>
-        </p:nvSpPr>
-        <p:spPr>
-          <a:xfrm>
-            <a:off x="5082989" y="4858298"/>
-            <a:ext cx="1272620" cy="743955"/>
-          </a:xfrm>
-          <a:prstGeom prst="roundRect">
-            <a:avLst/>
-          </a:prstGeom>
-          <a:ln>
-            <a:noFill/>
-          </a:ln>
-          <a:effectLst/>
-          <a:scene3d>
-            <a:camera prst="orthographicFront">
-              <a:rot lat="0" lon="0" rev="0"/>
-            </a:camera>
-            <a:lightRig rig="chilly" dir="t">
-              <a:rot lat="0" lon="0" rev="18480000"/>
-            </a:lightRig>
-          </a:scene3d>
-          <a:sp3d prstMaterial="clear">
-            <a:bevelT h="63500"/>
-          </a:sp3d>
-        </p:spPr>
-        <p:style>
-          <a:lnRef idx="2">
-            <a:schemeClr val="accent1">
-              <a:shade val="15000"/>
-            </a:schemeClr>
-          </a:lnRef>
-          <a:fillRef idx="1">
-            <a:schemeClr val="accent1"/>
-          </a:fillRef>
-          <a:effectRef idx="0">
-            <a:schemeClr val="accent1"/>
-          </a:effectRef>
-          <a:fontRef idx="minor">
-            <a:schemeClr val="lt1"/>
-          </a:fontRef>
-        </p:style>
-        <p:txBody>
-          <a:bodyPr rtlCol="0" anchor="ctr"/>
-          <a:lstStyle/>
-          <a:p>
-            <a:pPr algn="ctr"/>
-            <a:r>
-              <a:rPr lang="en-US" sz="1350" dirty="0">
-                <a:solidFill>
-                  <a:schemeClr val="tx2">
-                    <a:lumMod val="75000"/>
-                    <a:lumOff val="25000"/>
-                  </a:schemeClr>
-                </a:solidFill>
-              </a:rPr>
-              <a:t>Link Preview/</a:t>
-            </a:r>
-          </a:p>
-          <a:p>
-            <a:pPr algn="ctr"/>
-            <a:r>
-              <a:rPr lang="en-US" sz="1350" dirty="0">
-                <a:solidFill>
-                  <a:schemeClr val="tx2">
-                    <a:lumMod val="75000"/>
-                    <a:lumOff val="25000"/>
-                  </a:schemeClr>
-                </a:solidFill>
-              </a:rPr>
-              <a:t>Share Page</a:t>
-            </a:r>
-          </a:p>
-        </p:txBody>
-      </p:sp>
-      <p:sp>
-        <p:nvSpPr>
-          <p:cNvPr id="16" name="Rectangle: Rounded Corners 15">
-            <a:extLst>
-              <a:ext uri="{FF2B5EF4-FFF2-40B4-BE49-F238E27FC236}">
-                <a16:creationId xmlns:a16="http://schemas.microsoft.com/office/drawing/2014/main" id="{EDF54BB9-6567-FE7A-FF7F-882820F91D2A}"/>
-              </a:ext>
-            </a:extLst>
-          </p:cNvPr>
-          <p:cNvSpPr/>
-          <p:nvPr/>
-        </p:nvSpPr>
-        <p:spPr>
-          <a:xfrm>
-            <a:off x="7133666" y="3933442"/>
-            <a:ext cx="1272620" cy="743955"/>
-          </a:xfrm>
-          <a:prstGeom prst="roundRect">
-            <a:avLst/>
-          </a:prstGeom>
-          <a:ln>
-            <a:noFill/>
-          </a:ln>
-          <a:effectLst/>
-          <a:scene3d>
-            <a:camera prst="orthographicFront">
-              <a:rot lat="0" lon="0" rev="0"/>
-            </a:camera>
-            <a:lightRig rig="chilly" dir="t">
-              <a:rot lat="0" lon="0" rev="18480000"/>
-            </a:lightRig>
-          </a:scene3d>
-          <a:sp3d prstMaterial="clear">
-            <a:bevelT h="63500"/>
-          </a:sp3d>
-        </p:spPr>
-        <p:style>
-          <a:lnRef idx="2">
-            <a:schemeClr val="accent1">
-              <a:shade val="15000"/>
-            </a:schemeClr>
-          </a:lnRef>
-          <a:fillRef idx="1">
-            <a:schemeClr val="accent1"/>
-          </a:fillRef>
-          <a:effectRef idx="0">
-            <a:schemeClr val="accent1"/>
-          </a:effectRef>
-          <a:fontRef idx="minor">
-            <a:schemeClr val="lt1"/>
-          </a:fontRef>
-        </p:style>
-        <p:txBody>
-          <a:bodyPr rtlCol="0" anchor="ctr"/>
-          <a:lstStyle/>
-          <a:p>
-            <a:pPr algn="ctr"/>
-            <a:r>
-              <a:rPr lang="en-US" sz="1350" dirty="0">
-                <a:solidFill>
-                  <a:schemeClr val="tx2">
-                    <a:lumMod val="75000"/>
-                    <a:lumOff val="25000"/>
-                  </a:schemeClr>
-                </a:solidFill>
-              </a:rPr>
-              <a:t>User Login Page</a:t>
-            </a:r>
-          </a:p>
-        </p:txBody>
-      </p:sp>
-      <p:sp>
-        <p:nvSpPr>
-          <p:cNvPr id="17" name="Rectangle: Rounded Corners 16">
-            <a:extLst>
-              <a:ext uri="{FF2B5EF4-FFF2-40B4-BE49-F238E27FC236}">
-                <a16:creationId xmlns:a16="http://schemas.microsoft.com/office/drawing/2014/main" id="{B2C1F001-9460-992A-CEC3-059A35E11DB9}"/>
-              </a:ext>
-            </a:extLst>
-          </p:cNvPr>
-          <p:cNvSpPr/>
-          <p:nvPr/>
-        </p:nvSpPr>
-        <p:spPr>
-          <a:xfrm>
-            <a:off x="7133665" y="4839938"/>
-            <a:ext cx="1272620" cy="743955"/>
-          </a:xfrm>
-          <a:prstGeom prst="roundRect">
-            <a:avLst/>
-          </a:prstGeom>
-          <a:ln>
-            <a:noFill/>
-          </a:ln>
-          <a:effectLst/>
-          <a:scene3d>
-            <a:camera prst="orthographicFront">
-              <a:rot lat="0" lon="0" rev="0"/>
-            </a:camera>
-            <a:lightRig rig="chilly" dir="t">
-              <a:rot lat="0" lon="0" rev="18480000"/>
-            </a:lightRig>
-          </a:scene3d>
-          <a:sp3d prstMaterial="clear">
-            <a:bevelT h="63500"/>
-          </a:sp3d>
-        </p:spPr>
-        <p:style>
-          <a:lnRef idx="2">
-            <a:schemeClr val="accent1">
-              <a:shade val="15000"/>
-            </a:schemeClr>
-          </a:lnRef>
-          <a:fillRef idx="1">
-            <a:schemeClr val="accent1"/>
-          </a:fillRef>
-          <a:effectRef idx="0">
-            <a:schemeClr val="accent1"/>
-          </a:effectRef>
-          <a:fontRef idx="minor">
-            <a:schemeClr val="lt1"/>
-          </a:fontRef>
-        </p:style>
-        <p:txBody>
-          <a:bodyPr rtlCol="0" anchor="ctr"/>
-          <a:lstStyle/>
-          <a:p>
-            <a:pPr algn="ctr"/>
-            <a:r>
-              <a:rPr lang="en-US" sz="1350" dirty="0">
-                <a:solidFill>
-                  <a:schemeClr val="tx2">
-                    <a:lumMod val="75000"/>
-                    <a:lumOff val="25000"/>
-                  </a:schemeClr>
-                </a:solidFill>
-              </a:rPr>
               <a:t>Account Management Page</a:t>
             </a:r>
           </a:p>
@@ -4038,13 +3830,15 @@
               </a:ext>
             </a:extLst>
           </p:cNvPr>
-          <p:cNvCxnSpPr/>
+          <p:cNvCxnSpPr>
+            <a:cxnSpLocks/>
+          </p:cNvCxnSpPr>
           <p:nvPr/>
         </p:nvCxnSpPr>
         <p:spPr>
           <a:xfrm>
             <a:off x="959224" y="3708027"/>
-            <a:ext cx="0" cy="1473632"/>
+            <a:ext cx="0" cy="565956"/>
           </a:xfrm>
           <a:prstGeom prst="line">
             <a:avLst/>
@@ -4108,45 +3902,6 @@
       </p:cxnSp>
       <p:cxnSp>
         <p:nvCxnSpPr>
-          <p:cNvPr id="24" name="Straight Arrow Connector 23">
-            <a:extLst>
-              <a:ext uri="{FF2B5EF4-FFF2-40B4-BE49-F238E27FC236}">
-                <a16:creationId xmlns:a16="http://schemas.microsoft.com/office/drawing/2014/main" id="{A0AB0F40-633A-C589-9B59-5BAB5B3A9A42}"/>
-              </a:ext>
-            </a:extLst>
-          </p:cNvPr>
-          <p:cNvCxnSpPr/>
-          <p:nvPr/>
-        </p:nvCxnSpPr>
-        <p:spPr>
-          <a:xfrm>
-            <a:off x="959224" y="5171026"/>
-            <a:ext cx="107946" cy="1"/>
-          </a:xfrm>
-          <a:prstGeom prst="straightConnector1">
-            <a:avLst/>
-          </a:prstGeom>
-          <a:ln>
-            <a:tailEnd type="triangle"/>
-          </a:ln>
-        </p:spPr>
-        <p:style>
-          <a:lnRef idx="2">
-            <a:schemeClr val="accent1"/>
-          </a:lnRef>
-          <a:fillRef idx="0">
-            <a:schemeClr val="accent1"/>
-          </a:fillRef>
-          <a:effectRef idx="1">
-            <a:schemeClr val="accent1"/>
-          </a:effectRef>
-          <a:fontRef idx="minor">
-            <a:schemeClr val="tx1"/>
-          </a:fontRef>
-        </p:style>
-      </p:cxnSp>
-      <p:cxnSp>
-        <p:nvCxnSpPr>
           <p:cNvPr id="25" name="Straight Connector 24">
             <a:extLst>
               <a:ext uri="{FF2B5EF4-FFF2-40B4-BE49-F238E27FC236}">
@@ -4390,7 +4145,7 @@
         <p:spPr>
           <a:xfrm>
             <a:off x="3009646" y="3729291"/>
-            <a:ext cx="0" cy="2485439"/>
+            <a:ext cx="0" cy="565956"/>
           </a:xfrm>
           <a:prstGeom prst="line">
             <a:avLst/>
@@ -4426,84 +4181,6 @@
         <p:spPr>
           <a:xfrm>
             <a:off x="3009646" y="4295247"/>
-            <a:ext cx="107946" cy="1"/>
-          </a:xfrm>
-          <a:prstGeom prst="straightConnector1">
-            <a:avLst/>
-          </a:prstGeom>
-          <a:ln>
-            <a:tailEnd type="triangle"/>
-          </a:ln>
-        </p:spPr>
-        <p:style>
-          <a:lnRef idx="2">
-            <a:schemeClr val="accent1"/>
-          </a:lnRef>
-          <a:fillRef idx="0">
-            <a:schemeClr val="accent1"/>
-          </a:fillRef>
-          <a:effectRef idx="1">
-            <a:schemeClr val="accent1"/>
-          </a:effectRef>
-          <a:fontRef idx="minor">
-            <a:schemeClr val="tx1"/>
-          </a:fontRef>
-        </p:style>
-      </p:cxnSp>
-      <p:cxnSp>
-        <p:nvCxnSpPr>
-          <p:cNvPr id="33" name="Straight Arrow Connector 32">
-            <a:extLst>
-              <a:ext uri="{FF2B5EF4-FFF2-40B4-BE49-F238E27FC236}">
-                <a16:creationId xmlns:a16="http://schemas.microsoft.com/office/drawing/2014/main" id="{68955F6E-5F7B-2F04-553A-47DBBA847B23}"/>
-              </a:ext>
-            </a:extLst>
-          </p:cNvPr>
-          <p:cNvCxnSpPr/>
-          <p:nvPr/>
-        </p:nvCxnSpPr>
-        <p:spPr>
-          <a:xfrm>
-            <a:off x="3009646" y="5192290"/>
-            <a:ext cx="107946" cy="1"/>
-          </a:xfrm>
-          <a:prstGeom prst="straightConnector1">
-            <a:avLst/>
-          </a:prstGeom>
-          <a:ln>
-            <a:tailEnd type="triangle"/>
-          </a:ln>
-        </p:spPr>
-        <p:style>
-          <a:lnRef idx="2">
-            <a:schemeClr val="accent1"/>
-          </a:lnRef>
-          <a:fillRef idx="0">
-            <a:schemeClr val="accent1"/>
-          </a:fillRef>
-          <a:effectRef idx="1">
-            <a:schemeClr val="accent1"/>
-          </a:effectRef>
-          <a:fontRef idx="minor">
-            <a:schemeClr val="tx1"/>
-          </a:fontRef>
-        </p:style>
-      </p:cxnSp>
-      <p:cxnSp>
-        <p:nvCxnSpPr>
-          <p:cNvPr id="35" name="Straight Arrow Connector 34">
-            <a:extLst>
-              <a:ext uri="{FF2B5EF4-FFF2-40B4-BE49-F238E27FC236}">
-                <a16:creationId xmlns:a16="http://schemas.microsoft.com/office/drawing/2014/main" id="{728A83C5-66CF-6C56-9DD4-A5471C0CB8C4}"/>
-              </a:ext>
-            </a:extLst>
-          </p:cNvPr>
-          <p:cNvCxnSpPr/>
-          <p:nvPr/>
-        </p:nvCxnSpPr>
-        <p:spPr>
-          <a:xfrm>
-            <a:off x="3009646" y="6204098"/>
             <a:ext cx="107946" cy="1"/>
           </a:xfrm>
           <a:prstGeom prst="straightConnector1">

</xml_diff>